<commit_message>
Y AM I AWAKE
</commit_message>
<xml_diff>
--- a/report/figures/flowchart.pptx
+++ b/report/figures/flowchart.pptx
@@ -6,6 +6,7 @@
   </p:sldMasterIdLst>
   <p:sldIdLst>
     <p:sldId id="256" r:id="rId2"/>
+    <p:sldId id="257" r:id="rId3"/>
   </p:sldIdLst>
   <p:sldSz cx="12192000" cy="6858000"/>
   <p:notesSz cx="6858000" cy="9144000"/>
@@ -104,6 +105,11 @@
       </a:defRPr>
     </a:lvl9pPr>
   </p:defaultTextStyle>
+  <p:extLst>
+    <p:ext uri="{EFAFB233-063F-42B5-8137-9DF3F51BA10A}">
+      <p15:sldGuideLst xmlns:p15="http://schemas.microsoft.com/office/powerpoint/2012/main"/>
+    </p:ext>
+  </p:extLst>
 </p:presentation>
 </file>
 
@@ -256,7 +262,7 @@
           <a:p>
             <a:fld id="{D918C84F-5000-4BD5-98FC-FEF3364E41FE}" type="datetimeFigureOut">
               <a:rPr lang="en-GB" smtClean="0"/>
-              <a:t>01/06/2021</a:t>
+              <a:t>03/06/2021</a:t>
             </a:fld>
             <a:endParaRPr lang="en-GB"/>
           </a:p>
@@ -456,7 +462,7 @@
           <a:p>
             <a:fld id="{D918C84F-5000-4BD5-98FC-FEF3364E41FE}" type="datetimeFigureOut">
               <a:rPr lang="en-GB" smtClean="0"/>
-              <a:t>01/06/2021</a:t>
+              <a:t>03/06/2021</a:t>
             </a:fld>
             <a:endParaRPr lang="en-GB"/>
           </a:p>
@@ -666,7 +672,7 @@
           <a:p>
             <a:fld id="{D918C84F-5000-4BD5-98FC-FEF3364E41FE}" type="datetimeFigureOut">
               <a:rPr lang="en-GB" smtClean="0"/>
-              <a:t>01/06/2021</a:t>
+              <a:t>03/06/2021</a:t>
             </a:fld>
             <a:endParaRPr lang="en-GB"/>
           </a:p>
@@ -866,7 +872,7 @@
           <a:p>
             <a:fld id="{D918C84F-5000-4BD5-98FC-FEF3364E41FE}" type="datetimeFigureOut">
               <a:rPr lang="en-GB" smtClean="0"/>
-              <a:t>01/06/2021</a:t>
+              <a:t>03/06/2021</a:t>
             </a:fld>
             <a:endParaRPr lang="en-GB"/>
           </a:p>
@@ -1142,7 +1148,7 @@
           <a:p>
             <a:fld id="{D918C84F-5000-4BD5-98FC-FEF3364E41FE}" type="datetimeFigureOut">
               <a:rPr lang="en-GB" smtClean="0"/>
-              <a:t>01/06/2021</a:t>
+              <a:t>03/06/2021</a:t>
             </a:fld>
             <a:endParaRPr lang="en-GB"/>
           </a:p>
@@ -1410,7 +1416,7 @@
           <a:p>
             <a:fld id="{D918C84F-5000-4BD5-98FC-FEF3364E41FE}" type="datetimeFigureOut">
               <a:rPr lang="en-GB" smtClean="0"/>
-              <a:t>01/06/2021</a:t>
+              <a:t>03/06/2021</a:t>
             </a:fld>
             <a:endParaRPr lang="en-GB"/>
           </a:p>
@@ -1825,7 +1831,7 @@
           <a:p>
             <a:fld id="{D918C84F-5000-4BD5-98FC-FEF3364E41FE}" type="datetimeFigureOut">
               <a:rPr lang="en-GB" smtClean="0"/>
-              <a:t>01/06/2021</a:t>
+              <a:t>03/06/2021</a:t>
             </a:fld>
             <a:endParaRPr lang="en-GB"/>
           </a:p>
@@ -1967,7 +1973,7 @@
           <a:p>
             <a:fld id="{D918C84F-5000-4BD5-98FC-FEF3364E41FE}" type="datetimeFigureOut">
               <a:rPr lang="en-GB" smtClean="0"/>
-              <a:t>01/06/2021</a:t>
+              <a:t>03/06/2021</a:t>
             </a:fld>
             <a:endParaRPr lang="en-GB"/>
           </a:p>
@@ -2080,7 +2086,7 @@
           <a:p>
             <a:fld id="{D918C84F-5000-4BD5-98FC-FEF3364E41FE}" type="datetimeFigureOut">
               <a:rPr lang="en-GB" smtClean="0"/>
-              <a:t>01/06/2021</a:t>
+              <a:t>03/06/2021</a:t>
             </a:fld>
             <a:endParaRPr lang="en-GB"/>
           </a:p>
@@ -2393,7 +2399,7 @@
           <a:p>
             <a:fld id="{D918C84F-5000-4BD5-98FC-FEF3364E41FE}" type="datetimeFigureOut">
               <a:rPr lang="en-GB" smtClean="0"/>
-              <a:t>01/06/2021</a:t>
+              <a:t>03/06/2021</a:t>
             </a:fld>
             <a:endParaRPr lang="en-GB"/>
           </a:p>
@@ -2682,7 +2688,7 @@
           <a:p>
             <a:fld id="{D918C84F-5000-4BD5-98FC-FEF3364E41FE}" type="datetimeFigureOut">
               <a:rPr lang="en-GB" smtClean="0"/>
-              <a:t>01/06/2021</a:t>
+              <a:t>03/06/2021</a:t>
             </a:fld>
             <a:endParaRPr lang="en-GB"/>
           </a:p>
@@ -2925,7 +2931,7 @@
           <a:p>
             <a:fld id="{D918C84F-5000-4BD5-98FC-FEF3364E41FE}" type="datetimeFigureOut">
               <a:rPr lang="en-GB" smtClean="0"/>
-              <a:t>01/06/2021</a:t>
+              <a:t>03/06/2021</a:t>
             </a:fld>
             <a:endParaRPr lang="en-GB"/>
           </a:p>
@@ -3956,6 +3962,654 @@
 </p:sld>
 </file>
 
+<file path=ppt/slides/slide2.xml><?xml version="1.0" encoding="utf-8"?>
+<p:sld xmlns:a="http://schemas.openxmlformats.org/drawingml/2006/main" xmlns:r="http://schemas.openxmlformats.org/officeDocument/2006/relationships" xmlns:p="http://schemas.openxmlformats.org/presentationml/2006/main">
+  <p:cSld>
+    <p:spTree>
+      <p:nvGrpSpPr>
+        <p:cNvPr id="1" name=""/>
+        <p:cNvGrpSpPr/>
+        <p:nvPr/>
+      </p:nvGrpSpPr>
+      <p:grpSpPr>
+        <a:xfrm>
+          <a:off x="0" y="0"/>
+          <a:ext cx="0" cy="0"/>
+          <a:chOff x="0" y="0"/>
+          <a:chExt cx="0" cy="0"/>
+        </a:xfrm>
+      </p:grpSpPr>
+      <p:sp>
+        <p:nvSpPr>
+          <p:cNvPr id="4" name="Rectangle: Rounded Corners 3">
+            <a:extLst>
+              <a:ext uri="{FF2B5EF4-FFF2-40B4-BE49-F238E27FC236}">
+                <a16:creationId xmlns:a16="http://schemas.microsoft.com/office/drawing/2014/main" id="{6ADB3860-094B-4BC1-A2AE-A7A437453186}"/>
+              </a:ext>
+            </a:extLst>
+          </p:cNvPr>
+          <p:cNvSpPr/>
+          <p:nvPr/>
+        </p:nvSpPr>
+        <p:spPr>
+          <a:xfrm>
+            <a:off x="4302352" y="297972"/>
+            <a:ext cx="2173947" cy="914400"/>
+          </a:xfrm>
+          <a:prstGeom prst="roundRect">
+            <a:avLst/>
+          </a:prstGeom>
+          <a:solidFill>
+            <a:srgbClr val="FF99FF"/>
+          </a:solidFill>
+          <a:ln>
+            <a:solidFill>
+              <a:srgbClr val="FF66FF"/>
+            </a:solidFill>
+          </a:ln>
+        </p:spPr>
+        <p:style>
+          <a:lnRef idx="2">
+            <a:schemeClr val="accent1">
+              <a:shade val="50000"/>
+            </a:schemeClr>
+          </a:lnRef>
+          <a:fillRef idx="1">
+            <a:schemeClr val="accent1"/>
+          </a:fillRef>
+          <a:effectRef idx="0">
+            <a:schemeClr val="accent1"/>
+          </a:effectRef>
+          <a:fontRef idx="minor">
+            <a:schemeClr val="lt1"/>
+          </a:fontRef>
+        </p:style>
+        <p:txBody>
+          <a:bodyPr rtlCol="0" anchor="ctr"/>
+          <a:lstStyle/>
+          <a:p>
+            <a:pPr algn="ctr"/>
+            <a:r>
+              <a:rPr lang="en-GB" dirty="0"/>
+              <a:t>Generate scenarios</a:t>
+            </a:r>
+          </a:p>
+        </p:txBody>
+      </p:sp>
+      <p:sp>
+        <p:nvSpPr>
+          <p:cNvPr id="6" name="Rectangle: Rounded Corners 5">
+            <a:extLst>
+              <a:ext uri="{FF2B5EF4-FFF2-40B4-BE49-F238E27FC236}">
+                <a16:creationId xmlns:a16="http://schemas.microsoft.com/office/drawing/2014/main" id="{5B4DB860-75CB-422C-B0B8-017D4AB426E7}"/>
+              </a:ext>
+            </a:extLst>
+          </p:cNvPr>
+          <p:cNvSpPr/>
+          <p:nvPr/>
+        </p:nvSpPr>
+        <p:spPr>
+          <a:xfrm>
+            <a:off x="4302352" y="2128118"/>
+            <a:ext cx="2173947" cy="914400"/>
+          </a:xfrm>
+          <a:prstGeom prst="roundRect">
+            <a:avLst/>
+          </a:prstGeom>
+          <a:solidFill>
+            <a:srgbClr val="FF99FF"/>
+          </a:solidFill>
+          <a:ln>
+            <a:solidFill>
+              <a:srgbClr val="FF66FF"/>
+            </a:solidFill>
+          </a:ln>
+        </p:spPr>
+        <p:style>
+          <a:lnRef idx="2">
+            <a:schemeClr val="accent1">
+              <a:shade val="50000"/>
+            </a:schemeClr>
+          </a:lnRef>
+          <a:fillRef idx="1">
+            <a:schemeClr val="accent1"/>
+          </a:fillRef>
+          <a:effectRef idx="0">
+            <a:schemeClr val="accent1"/>
+          </a:effectRef>
+          <a:fontRef idx="minor">
+            <a:schemeClr val="lt1"/>
+          </a:fontRef>
+        </p:style>
+        <p:txBody>
+          <a:bodyPr rtlCol="0" anchor="ctr"/>
+          <a:lstStyle/>
+          <a:p>
+            <a:pPr algn="ctr"/>
+            <a:r>
+              <a:rPr lang="en-GB" dirty="0"/>
+              <a:t>Identify adaptation tipping points</a:t>
+            </a:r>
+          </a:p>
+        </p:txBody>
+      </p:sp>
+      <p:sp>
+        <p:nvSpPr>
+          <p:cNvPr id="7" name="Rectangle: Rounded Corners 6">
+            <a:extLst>
+              <a:ext uri="{FF2B5EF4-FFF2-40B4-BE49-F238E27FC236}">
+                <a16:creationId xmlns:a16="http://schemas.microsoft.com/office/drawing/2014/main" id="{00ED7C29-2DDF-4CC5-B37C-03C8F5580239}"/>
+              </a:ext>
+            </a:extLst>
+          </p:cNvPr>
+          <p:cNvSpPr/>
+          <p:nvPr/>
+        </p:nvSpPr>
+        <p:spPr>
+          <a:xfrm>
+            <a:off x="7107270" y="4052103"/>
+            <a:ext cx="2173947" cy="914400"/>
+          </a:xfrm>
+          <a:prstGeom prst="roundRect">
+            <a:avLst/>
+          </a:prstGeom>
+          <a:solidFill>
+            <a:srgbClr val="FF99FF"/>
+          </a:solidFill>
+          <a:ln>
+            <a:solidFill>
+              <a:srgbClr val="FF66FF"/>
+            </a:solidFill>
+          </a:ln>
+        </p:spPr>
+        <p:style>
+          <a:lnRef idx="2">
+            <a:schemeClr val="accent1">
+              <a:shade val="50000"/>
+            </a:schemeClr>
+          </a:lnRef>
+          <a:fillRef idx="1">
+            <a:schemeClr val="accent1"/>
+          </a:fillRef>
+          <a:effectRef idx="0">
+            <a:schemeClr val="accent1"/>
+          </a:effectRef>
+          <a:fontRef idx="minor">
+            <a:schemeClr val="lt1"/>
+          </a:fontRef>
+        </p:style>
+        <p:txBody>
+          <a:bodyPr rtlCol="0" anchor="ctr"/>
+          <a:lstStyle/>
+          <a:p>
+            <a:pPr algn="ctr"/>
+            <a:r>
+              <a:rPr lang="en-GB" dirty="0"/>
+              <a:t>Generate candidate solutions</a:t>
+            </a:r>
+          </a:p>
+        </p:txBody>
+      </p:sp>
+      <p:sp>
+        <p:nvSpPr>
+          <p:cNvPr id="9" name="Rectangle: Rounded Corners 8">
+            <a:extLst>
+              <a:ext uri="{FF2B5EF4-FFF2-40B4-BE49-F238E27FC236}">
+                <a16:creationId xmlns:a16="http://schemas.microsoft.com/office/drawing/2014/main" id="{FFBA75DA-35A7-4422-ACF0-8EF5C3004956}"/>
+              </a:ext>
+            </a:extLst>
+          </p:cNvPr>
+          <p:cNvSpPr/>
+          <p:nvPr/>
+        </p:nvSpPr>
+        <p:spPr>
+          <a:xfrm>
+            <a:off x="7107269" y="2128118"/>
+            <a:ext cx="2173947" cy="914400"/>
+          </a:xfrm>
+          <a:prstGeom prst="roundRect">
+            <a:avLst/>
+          </a:prstGeom>
+          <a:solidFill>
+            <a:srgbClr val="FF99FF"/>
+          </a:solidFill>
+          <a:ln>
+            <a:solidFill>
+              <a:srgbClr val="FF66FF"/>
+            </a:solidFill>
+          </a:ln>
+        </p:spPr>
+        <p:style>
+          <a:lnRef idx="2">
+            <a:schemeClr val="accent1">
+              <a:shade val="50000"/>
+            </a:schemeClr>
+          </a:lnRef>
+          <a:fillRef idx="1">
+            <a:schemeClr val="accent1"/>
+          </a:fillRef>
+          <a:effectRef idx="0">
+            <a:schemeClr val="accent1"/>
+          </a:effectRef>
+          <a:fontRef idx="minor">
+            <a:schemeClr val="lt1"/>
+          </a:fontRef>
+        </p:style>
+        <p:txBody>
+          <a:bodyPr rtlCol="0" anchor="ctr"/>
+          <a:lstStyle/>
+          <a:p>
+            <a:pPr algn="ctr"/>
+            <a:r>
+              <a:rPr lang="en-GB" dirty="0"/>
+              <a:t>Sensitivity analysis</a:t>
+            </a:r>
+          </a:p>
+        </p:txBody>
+      </p:sp>
+      <p:sp>
+        <p:nvSpPr>
+          <p:cNvPr id="10" name="Rectangle: Rounded Corners 9">
+            <a:extLst>
+              <a:ext uri="{FF2B5EF4-FFF2-40B4-BE49-F238E27FC236}">
+                <a16:creationId xmlns:a16="http://schemas.microsoft.com/office/drawing/2014/main" id="{4AEA9FA6-7138-494F-A521-8D5E394B457A}"/>
+              </a:ext>
+            </a:extLst>
+          </p:cNvPr>
+          <p:cNvSpPr/>
+          <p:nvPr/>
+        </p:nvSpPr>
+        <p:spPr>
+          <a:xfrm>
+            <a:off x="7107269" y="297972"/>
+            <a:ext cx="2173947" cy="914400"/>
+          </a:xfrm>
+          <a:prstGeom prst="roundRect">
+            <a:avLst/>
+          </a:prstGeom>
+          <a:solidFill>
+            <a:srgbClr val="FF99FF"/>
+          </a:solidFill>
+          <a:ln>
+            <a:solidFill>
+              <a:srgbClr val="FF66FF"/>
+            </a:solidFill>
+          </a:ln>
+        </p:spPr>
+        <p:style>
+          <a:lnRef idx="2">
+            <a:schemeClr val="accent1">
+              <a:shade val="50000"/>
+            </a:schemeClr>
+          </a:lnRef>
+          <a:fillRef idx="1">
+            <a:schemeClr val="accent1"/>
+          </a:fillRef>
+          <a:effectRef idx="0">
+            <a:schemeClr val="accent1"/>
+          </a:effectRef>
+          <a:fontRef idx="minor">
+            <a:schemeClr val="lt1"/>
+          </a:fontRef>
+        </p:style>
+        <p:txBody>
+          <a:bodyPr rtlCol="0" anchor="ctr"/>
+          <a:lstStyle/>
+          <a:p>
+            <a:pPr algn="ctr"/>
+            <a:r>
+              <a:rPr lang="en-GB" dirty="0"/>
+              <a:t>Update adaptation pathway</a:t>
+            </a:r>
+          </a:p>
+        </p:txBody>
+      </p:sp>
+      <p:cxnSp>
+        <p:nvCxnSpPr>
+          <p:cNvPr id="12" name="Straight Arrow Connector 11">
+            <a:extLst>
+              <a:ext uri="{FF2B5EF4-FFF2-40B4-BE49-F238E27FC236}">
+                <a16:creationId xmlns:a16="http://schemas.microsoft.com/office/drawing/2014/main" id="{9B96C25D-F4D1-4735-B4EA-ACA52A3D6D74}"/>
+              </a:ext>
+            </a:extLst>
+          </p:cNvPr>
+          <p:cNvCxnSpPr>
+            <a:cxnSpLocks/>
+            <a:stCxn id="4" idx="2"/>
+            <a:endCxn id="6" idx="0"/>
+          </p:cNvCxnSpPr>
+          <p:nvPr/>
+        </p:nvCxnSpPr>
+        <p:spPr>
+          <a:xfrm>
+            <a:off x="5389326" y="1212372"/>
+            <a:ext cx="0" cy="915746"/>
+          </a:xfrm>
+          <a:prstGeom prst="straightConnector1">
+            <a:avLst/>
+          </a:prstGeom>
+          <a:ln>
+            <a:solidFill>
+              <a:srgbClr val="FF66FF"/>
+            </a:solidFill>
+            <a:tailEnd type="triangle"/>
+          </a:ln>
+        </p:spPr>
+        <p:style>
+          <a:lnRef idx="1">
+            <a:schemeClr val="accent1"/>
+          </a:lnRef>
+          <a:fillRef idx="0">
+            <a:schemeClr val="accent1"/>
+          </a:fillRef>
+          <a:effectRef idx="0">
+            <a:schemeClr val="accent1"/>
+          </a:effectRef>
+          <a:fontRef idx="minor">
+            <a:schemeClr val="tx1"/>
+          </a:fontRef>
+        </p:style>
+      </p:cxnSp>
+      <p:sp>
+        <p:nvSpPr>
+          <p:cNvPr id="23" name="Rectangle: Rounded Corners 22">
+            <a:extLst>
+              <a:ext uri="{FF2B5EF4-FFF2-40B4-BE49-F238E27FC236}">
+                <a16:creationId xmlns:a16="http://schemas.microsoft.com/office/drawing/2014/main" id="{2E55523B-BD6C-44C4-94D2-774DA59A1F88}"/>
+              </a:ext>
+            </a:extLst>
+          </p:cNvPr>
+          <p:cNvSpPr/>
+          <p:nvPr/>
+        </p:nvSpPr>
+        <p:spPr>
+          <a:xfrm>
+            <a:off x="4302352" y="4052103"/>
+            <a:ext cx="2173947" cy="914400"/>
+          </a:xfrm>
+          <a:prstGeom prst="roundRect">
+            <a:avLst/>
+          </a:prstGeom>
+          <a:solidFill>
+            <a:srgbClr val="FF99FF"/>
+          </a:solidFill>
+          <a:ln>
+            <a:solidFill>
+              <a:srgbClr val="FF66FF"/>
+            </a:solidFill>
+          </a:ln>
+        </p:spPr>
+        <p:style>
+          <a:lnRef idx="2">
+            <a:schemeClr val="accent1">
+              <a:shade val="50000"/>
+            </a:schemeClr>
+          </a:lnRef>
+          <a:fillRef idx="1">
+            <a:schemeClr val="accent1"/>
+          </a:fillRef>
+          <a:effectRef idx="0">
+            <a:schemeClr val="accent1"/>
+          </a:effectRef>
+          <a:fontRef idx="minor">
+            <a:schemeClr val="lt1"/>
+          </a:fontRef>
+        </p:style>
+        <p:txBody>
+          <a:bodyPr rtlCol="0" anchor="ctr"/>
+          <a:lstStyle/>
+          <a:p>
+            <a:pPr algn="ctr"/>
+            <a:r>
+              <a:rPr lang="en-GB" dirty="0"/>
+              <a:t>Scenario selection</a:t>
+            </a:r>
+          </a:p>
+        </p:txBody>
+      </p:sp>
+      <p:cxnSp>
+        <p:nvCxnSpPr>
+          <p:cNvPr id="58" name="Straight Arrow Connector 57">
+            <a:extLst>
+              <a:ext uri="{FF2B5EF4-FFF2-40B4-BE49-F238E27FC236}">
+                <a16:creationId xmlns:a16="http://schemas.microsoft.com/office/drawing/2014/main" id="{5C7DE352-EA72-4947-A0BA-488D3B0575CA}"/>
+              </a:ext>
+            </a:extLst>
+          </p:cNvPr>
+          <p:cNvCxnSpPr>
+            <a:cxnSpLocks/>
+            <a:stCxn id="6" idx="2"/>
+            <a:endCxn id="23" idx="0"/>
+          </p:cNvCxnSpPr>
+          <p:nvPr/>
+        </p:nvCxnSpPr>
+        <p:spPr>
+          <a:xfrm>
+            <a:off x="5389326" y="3042518"/>
+            <a:ext cx="0" cy="1009585"/>
+          </a:xfrm>
+          <a:prstGeom prst="straightConnector1">
+            <a:avLst/>
+          </a:prstGeom>
+          <a:ln>
+            <a:solidFill>
+              <a:srgbClr val="FF66FF"/>
+            </a:solidFill>
+            <a:tailEnd type="triangle"/>
+          </a:ln>
+        </p:spPr>
+        <p:style>
+          <a:lnRef idx="1">
+            <a:schemeClr val="accent1"/>
+          </a:lnRef>
+          <a:fillRef idx="0">
+            <a:schemeClr val="accent1"/>
+          </a:fillRef>
+          <a:effectRef idx="0">
+            <a:schemeClr val="accent1"/>
+          </a:effectRef>
+          <a:fontRef idx="minor">
+            <a:schemeClr val="tx1"/>
+          </a:fontRef>
+        </p:style>
+      </p:cxnSp>
+      <p:cxnSp>
+        <p:nvCxnSpPr>
+          <p:cNvPr id="59" name="Straight Arrow Connector 58">
+            <a:extLst>
+              <a:ext uri="{FF2B5EF4-FFF2-40B4-BE49-F238E27FC236}">
+                <a16:creationId xmlns:a16="http://schemas.microsoft.com/office/drawing/2014/main" id="{02379286-8A5E-442F-AF7E-AAAB690B42C2}"/>
+              </a:ext>
+            </a:extLst>
+          </p:cNvPr>
+          <p:cNvCxnSpPr>
+            <a:cxnSpLocks/>
+            <a:stCxn id="23" idx="3"/>
+            <a:endCxn id="7" idx="1"/>
+          </p:cNvCxnSpPr>
+          <p:nvPr/>
+        </p:nvCxnSpPr>
+        <p:spPr>
+          <a:xfrm>
+            <a:off x="6476299" y="4509303"/>
+            <a:ext cx="630971" cy="0"/>
+          </a:xfrm>
+          <a:prstGeom prst="straightConnector1">
+            <a:avLst/>
+          </a:prstGeom>
+          <a:ln>
+            <a:solidFill>
+              <a:srgbClr val="FF66FF"/>
+            </a:solidFill>
+            <a:tailEnd type="triangle"/>
+          </a:ln>
+        </p:spPr>
+        <p:style>
+          <a:lnRef idx="1">
+            <a:schemeClr val="accent1"/>
+          </a:lnRef>
+          <a:fillRef idx="0">
+            <a:schemeClr val="accent1"/>
+          </a:fillRef>
+          <a:effectRef idx="0">
+            <a:schemeClr val="accent1"/>
+          </a:effectRef>
+          <a:fontRef idx="minor">
+            <a:schemeClr val="tx1"/>
+          </a:fontRef>
+        </p:style>
+      </p:cxnSp>
+      <p:cxnSp>
+        <p:nvCxnSpPr>
+          <p:cNvPr id="63" name="Straight Arrow Connector 62">
+            <a:extLst>
+              <a:ext uri="{FF2B5EF4-FFF2-40B4-BE49-F238E27FC236}">
+                <a16:creationId xmlns:a16="http://schemas.microsoft.com/office/drawing/2014/main" id="{E47DD148-5065-459F-81DC-ABA84B290DD7}"/>
+              </a:ext>
+            </a:extLst>
+          </p:cNvPr>
+          <p:cNvCxnSpPr>
+            <a:cxnSpLocks/>
+            <a:stCxn id="7" idx="0"/>
+            <a:endCxn id="9" idx="2"/>
+          </p:cNvCxnSpPr>
+          <p:nvPr/>
+        </p:nvCxnSpPr>
+        <p:spPr>
+          <a:xfrm flipH="1" flipV="1">
+            <a:off x="8194243" y="3042518"/>
+            <a:ext cx="1" cy="1009585"/>
+          </a:xfrm>
+          <a:prstGeom prst="straightConnector1">
+            <a:avLst/>
+          </a:prstGeom>
+          <a:ln>
+            <a:solidFill>
+              <a:srgbClr val="FF66FF"/>
+            </a:solidFill>
+            <a:tailEnd type="triangle"/>
+          </a:ln>
+        </p:spPr>
+        <p:style>
+          <a:lnRef idx="1">
+            <a:schemeClr val="accent1"/>
+          </a:lnRef>
+          <a:fillRef idx="0">
+            <a:schemeClr val="accent1"/>
+          </a:fillRef>
+          <a:effectRef idx="0">
+            <a:schemeClr val="accent1"/>
+          </a:effectRef>
+          <a:fontRef idx="minor">
+            <a:schemeClr val="tx1"/>
+          </a:fontRef>
+        </p:style>
+      </p:cxnSp>
+      <p:cxnSp>
+        <p:nvCxnSpPr>
+          <p:cNvPr id="67" name="Straight Arrow Connector 66">
+            <a:extLst>
+              <a:ext uri="{FF2B5EF4-FFF2-40B4-BE49-F238E27FC236}">
+                <a16:creationId xmlns:a16="http://schemas.microsoft.com/office/drawing/2014/main" id="{BCF7CCA4-EEB8-4C79-9F24-C0D6D355A77E}"/>
+              </a:ext>
+            </a:extLst>
+          </p:cNvPr>
+          <p:cNvCxnSpPr>
+            <a:cxnSpLocks/>
+            <a:stCxn id="9" idx="0"/>
+            <a:endCxn id="10" idx="2"/>
+          </p:cNvCxnSpPr>
+          <p:nvPr/>
+        </p:nvCxnSpPr>
+        <p:spPr>
+          <a:xfrm flipV="1">
+            <a:off x="8194243" y="1212372"/>
+            <a:ext cx="0" cy="915746"/>
+          </a:xfrm>
+          <a:prstGeom prst="straightConnector1">
+            <a:avLst/>
+          </a:prstGeom>
+          <a:ln>
+            <a:solidFill>
+              <a:srgbClr val="FF66FF"/>
+            </a:solidFill>
+            <a:tailEnd type="triangle"/>
+          </a:ln>
+        </p:spPr>
+        <p:style>
+          <a:lnRef idx="1">
+            <a:schemeClr val="accent1"/>
+          </a:lnRef>
+          <a:fillRef idx="0">
+            <a:schemeClr val="accent1"/>
+          </a:fillRef>
+          <a:effectRef idx="0">
+            <a:schemeClr val="accent1"/>
+          </a:effectRef>
+          <a:fontRef idx="minor">
+            <a:schemeClr val="tx1"/>
+          </a:fontRef>
+        </p:style>
+      </p:cxnSp>
+      <p:cxnSp>
+        <p:nvCxnSpPr>
+          <p:cNvPr id="72" name="Straight Arrow Connector 71">
+            <a:extLst>
+              <a:ext uri="{FF2B5EF4-FFF2-40B4-BE49-F238E27FC236}">
+                <a16:creationId xmlns:a16="http://schemas.microsoft.com/office/drawing/2014/main" id="{86D8DF9D-1DB1-411E-8ECC-2C9287F357F7}"/>
+              </a:ext>
+            </a:extLst>
+          </p:cNvPr>
+          <p:cNvCxnSpPr>
+            <a:cxnSpLocks/>
+            <a:stCxn id="9" idx="1"/>
+            <a:endCxn id="6" idx="3"/>
+          </p:cNvCxnSpPr>
+          <p:nvPr/>
+        </p:nvCxnSpPr>
+        <p:spPr>
+          <a:xfrm flipH="1">
+            <a:off x="6476299" y="2585318"/>
+            <a:ext cx="630970" cy="0"/>
+          </a:xfrm>
+          <a:prstGeom prst="straightConnector1">
+            <a:avLst/>
+          </a:prstGeom>
+          <a:ln>
+            <a:solidFill>
+              <a:srgbClr val="FF66FF"/>
+            </a:solidFill>
+            <a:tailEnd type="triangle"/>
+          </a:ln>
+        </p:spPr>
+        <p:style>
+          <a:lnRef idx="1">
+            <a:schemeClr val="accent1"/>
+          </a:lnRef>
+          <a:fillRef idx="0">
+            <a:schemeClr val="accent1"/>
+          </a:fillRef>
+          <a:effectRef idx="0">
+            <a:schemeClr val="accent1"/>
+          </a:effectRef>
+          <a:fontRef idx="minor">
+            <a:schemeClr val="tx1"/>
+          </a:fontRef>
+        </p:style>
+      </p:cxnSp>
+    </p:spTree>
+    <p:extLst>
+      <p:ext uri="{BB962C8B-B14F-4D97-AF65-F5344CB8AC3E}">
+        <p14:creationId xmlns:p14="http://schemas.microsoft.com/office/powerpoint/2010/main" val="4181852586"/>
+      </p:ext>
+    </p:extLst>
+  </p:cSld>
+  <p:clrMapOvr>
+    <a:masterClrMapping/>
+  </p:clrMapOvr>
+</p:sld>
+</file>
+
 <file path=ppt/theme/theme1.xml><?xml version="1.0" encoding="utf-8"?>
 <a:theme xmlns:a="http://schemas.openxmlformats.org/drawingml/2006/main" name="Office Theme">
   <a:themeElements>

</xml_diff>